<commit_message>
Enhanced and unified CMSIS-RTOS2 Mutex documentation.
</commit_message>
<xml_diff>
--- a/CMSIS/DoxyGen/src/images/TheoryOfOperation.pptx
+++ b/CMSIS/DoxyGen/src/images/TheoryOfOperation.pptx
@@ -6,6 +6,7 @@
   </p:sldMasterIdLst>
   <p:sldIdLst>
     <p:sldId id="256" r:id="rId2"/>
+    <p:sldId id="257" r:id="rId3"/>
   </p:sldIdLst>
   <p:sldSz cx="9144000" cy="5715000" type="screen16x10"/>
   <p:notesSz cx="6858000" cy="9144000"/>
@@ -289,7 +290,7 @@
             <a:fld id="{1D8BD707-D9CF-40AE-B4C6-C98DA3205C09}" type="datetimeFigureOut">
               <a:rPr lang="en-US" smtClean="0"/>
               <a:pPr/>
-              <a:t>4/10/2017</a:t>
+              <a:t>4/11/2017</a:t>
             </a:fld>
             <a:endParaRPr lang="en-US"/>
           </a:p>
@@ -456,7 +457,7 @@
             <a:fld id="{1D8BD707-D9CF-40AE-B4C6-C98DA3205C09}" type="datetimeFigureOut">
               <a:rPr lang="en-US" smtClean="0"/>
               <a:pPr/>
-              <a:t>4/10/2017</a:t>
+              <a:t>4/11/2017</a:t>
             </a:fld>
             <a:endParaRPr lang="en-US"/>
           </a:p>
@@ -633,7 +634,7 @@
             <a:fld id="{1D8BD707-D9CF-40AE-B4C6-C98DA3205C09}" type="datetimeFigureOut">
               <a:rPr lang="en-US" smtClean="0"/>
               <a:pPr/>
-              <a:t>4/10/2017</a:t>
+              <a:t>4/11/2017</a:t>
             </a:fld>
             <a:endParaRPr lang="en-US"/>
           </a:p>
@@ -800,7 +801,7 @@
             <a:fld id="{1D8BD707-D9CF-40AE-B4C6-C98DA3205C09}" type="datetimeFigureOut">
               <a:rPr lang="en-US" smtClean="0"/>
               <a:pPr/>
-              <a:t>4/10/2017</a:t>
+              <a:t>4/11/2017</a:t>
             </a:fld>
             <a:endParaRPr lang="en-US"/>
           </a:p>
@@ -1043,7 +1044,7 @@
             <a:fld id="{1D8BD707-D9CF-40AE-B4C6-C98DA3205C09}" type="datetimeFigureOut">
               <a:rPr lang="en-US" smtClean="0"/>
               <a:pPr/>
-              <a:t>4/10/2017</a:t>
+              <a:t>4/11/2017</a:t>
             </a:fld>
             <a:endParaRPr lang="en-US"/>
           </a:p>
@@ -1328,7 +1329,7 @@
             <a:fld id="{1D8BD707-D9CF-40AE-B4C6-C98DA3205C09}" type="datetimeFigureOut">
               <a:rPr lang="en-US" smtClean="0"/>
               <a:pPr/>
-              <a:t>4/10/2017</a:t>
+              <a:t>4/11/2017</a:t>
             </a:fld>
             <a:endParaRPr lang="en-US"/>
           </a:p>
@@ -1747,7 +1748,7 @@
             <a:fld id="{1D8BD707-D9CF-40AE-B4C6-C98DA3205C09}" type="datetimeFigureOut">
               <a:rPr lang="en-US" smtClean="0"/>
               <a:pPr/>
-              <a:t>4/10/2017</a:t>
+              <a:t>4/11/2017</a:t>
             </a:fld>
             <a:endParaRPr lang="en-US"/>
           </a:p>
@@ -1862,7 +1863,7 @@
             <a:fld id="{1D8BD707-D9CF-40AE-B4C6-C98DA3205C09}" type="datetimeFigureOut">
               <a:rPr lang="en-US" smtClean="0"/>
               <a:pPr/>
-              <a:t>4/10/2017</a:t>
+              <a:t>4/11/2017</a:t>
             </a:fld>
             <a:endParaRPr lang="en-US"/>
           </a:p>
@@ -1954,7 +1955,7 @@
             <a:fld id="{1D8BD707-D9CF-40AE-B4C6-C98DA3205C09}" type="datetimeFigureOut">
               <a:rPr lang="en-US" smtClean="0"/>
               <a:pPr/>
-              <a:t>4/10/2017</a:t>
+              <a:t>4/11/2017</a:t>
             </a:fld>
             <a:endParaRPr lang="en-US"/>
           </a:p>
@@ -2228,7 +2229,7 @@
             <a:fld id="{1D8BD707-D9CF-40AE-B4C6-C98DA3205C09}" type="datetimeFigureOut">
               <a:rPr lang="en-US" smtClean="0"/>
               <a:pPr/>
-              <a:t>4/10/2017</a:t>
+              <a:t>4/11/2017</a:t>
             </a:fld>
             <a:endParaRPr lang="en-US"/>
           </a:p>
@@ -2478,7 +2479,7 @@
             <a:fld id="{1D8BD707-D9CF-40AE-B4C6-C98DA3205C09}" type="datetimeFigureOut">
               <a:rPr lang="en-US" smtClean="0"/>
               <a:pPr/>
-              <a:t>4/10/2017</a:t>
+              <a:t>4/11/2017</a:t>
             </a:fld>
             <a:endParaRPr lang="en-US"/>
           </a:p>
@@ -2688,7 +2689,7 @@
             <a:fld id="{1D8BD707-D9CF-40AE-B4C6-C98DA3205C09}" type="datetimeFigureOut">
               <a:rPr lang="en-US" smtClean="0"/>
               <a:pPr/>
-              <a:t>4/10/2017</a:t>
+              <a:t>4/11/2017</a:t>
             </a:fld>
             <a:endParaRPr lang="en-US"/>
           </a:p>
@@ -5757,6 +5758,480 @@
 </p:sld>
 </file>
 
+<file path=ppt/slides/slide2.xml><?xml version="1.0" encoding="utf-8"?>
+<p:sld xmlns:a="http://schemas.openxmlformats.org/drawingml/2006/main" xmlns:r="http://schemas.openxmlformats.org/officeDocument/2006/relationships" xmlns:p="http://schemas.openxmlformats.org/presentationml/2006/main">
+  <p:cSld>
+    <p:spTree>
+      <p:nvGrpSpPr>
+        <p:cNvPr id="1" name=""/>
+        <p:cNvGrpSpPr/>
+        <p:nvPr/>
+      </p:nvGrpSpPr>
+      <p:grpSpPr>
+        <a:xfrm>
+          <a:off x="0" y="0"/>
+          <a:ext cx="0" cy="0"/>
+          <a:chOff x="0" y="0"/>
+          <a:chExt cx="0" cy="0"/>
+        </a:xfrm>
+      </p:grpSpPr>
+      <p:sp>
+        <p:nvSpPr>
+          <p:cNvPr id="2" name="Oval 1"/>
+          <p:cNvSpPr/>
+          <p:nvPr/>
+        </p:nvSpPr>
+        <p:spPr>
+          <a:xfrm>
+            <a:off x="3352800" y="1028700"/>
+            <a:ext cx="1524000" cy="838200"/>
+          </a:xfrm>
+          <a:prstGeom prst="ellipse">
+            <a:avLst/>
+          </a:prstGeom>
+          <a:ln w="28575"/>
+        </p:spPr>
+        <p:style>
+          <a:lnRef idx="2">
+            <a:schemeClr val="accent1">
+              <a:shade val="50000"/>
+            </a:schemeClr>
+          </a:lnRef>
+          <a:fillRef idx="1">
+            <a:schemeClr val="accent1"/>
+          </a:fillRef>
+          <a:effectRef idx="0">
+            <a:schemeClr val="accent1"/>
+          </a:effectRef>
+          <a:fontRef idx="minor">
+            <a:schemeClr val="lt1"/>
+          </a:fontRef>
+        </p:style>
+        <p:txBody>
+          <a:bodyPr rtlCol="0" anchor="ctr"/>
+          <a:lstStyle/>
+          <a:p>
+            <a:pPr algn="ctr"/>
+            <a:r>
+              <a:rPr lang="en-GB" dirty="0" smtClean="0"/>
+              <a:t>available</a:t>
+            </a:r>
+            <a:endParaRPr lang="en-GB" dirty="0"/>
+          </a:p>
+        </p:txBody>
+      </p:sp>
+      <p:sp>
+        <p:nvSpPr>
+          <p:cNvPr id="4" name="Oval 3"/>
+          <p:cNvSpPr/>
+          <p:nvPr/>
+        </p:nvSpPr>
+        <p:spPr>
+          <a:xfrm>
+            <a:off x="3352800" y="2857500"/>
+            <a:ext cx="1524000" cy="838200"/>
+          </a:xfrm>
+          <a:prstGeom prst="ellipse">
+            <a:avLst/>
+          </a:prstGeom>
+          <a:ln w="28575"/>
+        </p:spPr>
+        <p:style>
+          <a:lnRef idx="2">
+            <a:schemeClr val="accent1">
+              <a:shade val="50000"/>
+            </a:schemeClr>
+          </a:lnRef>
+          <a:fillRef idx="1">
+            <a:schemeClr val="accent1"/>
+          </a:fillRef>
+          <a:effectRef idx="0">
+            <a:schemeClr val="accent1"/>
+          </a:effectRef>
+          <a:fontRef idx="minor">
+            <a:schemeClr val="lt1"/>
+          </a:fontRef>
+        </p:style>
+        <p:txBody>
+          <a:bodyPr rtlCol="0" anchor="ctr"/>
+          <a:lstStyle/>
+          <a:p>
+            <a:pPr algn="ctr"/>
+            <a:r>
+              <a:rPr lang="en-GB" dirty="0" smtClean="0"/>
+              <a:t>blocked</a:t>
+            </a:r>
+            <a:endParaRPr lang="en-GB" dirty="0"/>
+          </a:p>
+        </p:txBody>
+      </p:sp>
+      <p:cxnSp>
+        <p:nvCxnSpPr>
+          <p:cNvPr id="8" name="Straight Arrow Connector 7"/>
+          <p:cNvCxnSpPr>
+            <a:stCxn id="2" idx="3"/>
+            <a:endCxn id="4" idx="1"/>
+          </p:cNvCxnSpPr>
+          <p:nvPr/>
+        </p:nvCxnSpPr>
+        <p:spPr>
+          <a:xfrm>
+            <a:off x="3575985" y="1744148"/>
+            <a:ext cx="0" cy="1236104"/>
+          </a:xfrm>
+          <a:prstGeom prst="straightConnector1">
+            <a:avLst/>
+          </a:prstGeom>
+          <a:ln w="19050">
+            <a:tailEnd type="arrow"/>
+          </a:ln>
+        </p:spPr>
+        <p:style>
+          <a:lnRef idx="1">
+            <a:schemeClr val="accent1"/>
+          </a:lnRef>
+          <a:fillRef idx="0">
+            <a:schemeClr val="accent1"/>
+          </a:fillRef>
+          <a:effectRef idx="0">
+            <a:schemeClr val="accent1"/>
+          </a:effectRef>
+          <a:fontRef idx="minor">
+            <a:schemeClr val="tx1"/>
+          </a:fontRef>
+        </p:style>
+      </p:cxnSp>
+      <p:cxnSp>
+        <p:nvCxnSpPr>
+          <p:cNvPr id="10" name="Straight Arrow Connector 9"/>
+          <p:cNvCxnSpPr>
+            <a:stCxn id="4" idx="7"/>
+            <a:endCxn id="2" idx="5"/>
+          </p:cNvCxnSpPr>
+          <p:nvPr/>
+        </p:nvCxnSpPr>
+        <p:spPr>
+          <a:xfrm flipV="1">
+            <a:off x="4653615" y="1744148"/>
+            <a:ext cx="0" cy="1236104"/>
+          </a:xfrm>
+          <a:prstGeom prst="straightConnector1">
+            <a:avLst/>
+          </a:prstGeom>
+          <a:ln w="19050">
+            <a:tailEnd type="arrow"/>
+          </a:ln>
+        </p:spPr>
+        <p:style>
+          <a:lnRef idx="1">
+            <a:schemeClr val="accent1"/>
+          </a:lnRef>
+          <a:fillRef idx="0">
+            <a:schemeClr val="accent1"/>
+          </a:fillRef>
+          <a:effectRef idx="0">
+            <a:schemeClr val="accent1"/>
+          </a:effectRef>
+          <a:fontRef idx="minor">
+            <a:schemeClr val="tx1"/>
+          </a:fontRef>
+        </p:style>
+      </p:cxnSp>
+      <p:sp>
+        <p:nvSpPr>
+          <p:cNvPr id="11" name="TextBox 10"/>
+          <p:cNvSpPr txBox="1"/>
+          <p:nvPr/>
+        </p:nvSpPr>
+        <p:spPr>
+          <a:xfrm>
+            <a:off x="2029086" y="1954040"/>
+            <a:ext cx="1546898" cy="738664"/>
+          </a:xfrm>
+          <a:prstGeom prst="rect">
+            <a:avLst/>
+          </a:prstGeom>
+          <a:noFill/>
+        </p:spPr>
+        <p:txBody>
+          <a:bodyPr wrap="none" rtlCol="0">
+            <a:spAutoFit/>
+          </a:bodyPr>
+          <a:lstStyle/>
+          <a:p>
+            <a:r>
+              <a:rPr lang="en-GB" sz="1400" dirty="0" err="1" smtClean="0"/>
+              <a:t>osMutexAcquire</a:t>
+            </a:r>
+            <a:r>
+              <a:rPr lang="en-GB" sz="1400" dirty="0" smtClean="0"/>
+              <a:t>() </a:t>
+            </a:r>
+          </a:p>
+          <a:p>
+            <a:r>
+              <a:rPr lang="en-GB" sz="1400" dirty="0" smtClean="0"/>
+              <a:t>/ owner = running,</a:t>
+            </a:r>
+          </a:p>
+          <a:p>
+            <a:r>
+              <a:rPr lang="en-GB" sz="1400" dirty="0" smtClean="0"/>
+              <a:t>count = 0</a:t>
+            </a:r>
+          </a:p>
+        </p:txBody>
+      </p:sp>
+      <p:sp>
+        <p:nvSpPr>
+          <p:cNvPr id="12" name="TextBox 11"/>
+          <p:cNvSpPr txBox="1"/>
+          <p:nvPr/>
+        </p:nvSpPr>
+        <p:spPr>
+          <a:xfrm>
+            <a:off x="4653615" y="1954040"/>
+            <a:ext cx="2852928" cy="738664"/>
+          </a:xfrm>
+          <a:prstGeom prst="rect">
+            <a:avLst/>
+          </a:prstGeom>
+          <a:noFill/>
+        </p:spPr>
+        <p:txBody>
+          <a:bodyPr wrap="square" rtlCol="0">
+            <a:spAutoFit/>
+          </a:bodyPr>
+          <a:lstStyle/>
+          <a:p>
+            <a:r>
+              <a:rPr lang="en-GB" sz="1400" dirty="0" err="1" smtClean="0"/>
+              <a:t>osMutexRelease</a:t>
+            </a:r>
+            <a:r>
+              <a:rPr lang="en-GB" sz="1400" dirty="0" smtClean="0"/>
+              <a:t>()</a:t>
+            </a:r>
+            <a:r>
+              <a:rPr lang="en-GB" sz="1400" dirty="0"/>
+              <a:t> </a:t>
+            </a:r>
+            <a:endParaRPr lang="en-GB" sz="1400" dirty="0" smtClean="0"/>
+          </a:p>
+          <a:p>
+            <a:r>
+              <a:rPr lang="en-GB" sz="1400" dirty="0" smtClean="0"/>
+              <a:t>[</a:t>
+            </a:r>
+            <a:r>
+              <a:rPr lang="en-GB" sz="1400" dirty="0"/>
+              <a:t>owner == running </a:t>
+            </a:r>
+            <a:r>
+              <a:rPr lang="en-GB" sz="1400" dirty="0" smtClean="0"/>
+              <a:t>&amp; !count]</a:t>
+            </a:r>
+          </a:p>
+          <a:p>
+            <a:r>
+              <a:rPr lang="en-GB" sz="1400" dirty="0" smtClean="0"/>
+              <a:t>/ </a:t>
+            </a:r>
+            <a:r>
+              <a:rPr lang="en-GB" sz="1400" dirty="0"/>
+              <a:t>owner = </a:t>
+            </a:r>
+            <a:r>
+              <a:rPr lang="en-GB" sz="1400" dirty="0" smtClean="0"/>
+              <a:t>NULL</a:t>
+            </a:r>
+            <a:endParaRPr lang="en-GB" sz="1400" dirty="0"/>
+          </a:p>
+        </p:txBody>
+      </p:sp>
+      <p:cxnSp>
+        <p:nvCxnSpPr>
+          <p:cNvPr id="14" name="Elbow Connector 13"/>
+          <p:cNvCxnSpPr>
+            <a:stCxn id="4" idx="2"/>
+            <a:endCxn id="4" idx="3"/>
+          </p:cNvCxnSpPr>
+          <p:nvPr/>
+        </p:nvCxnSpPr>
+        <p:spPr>
+          <a:xfrm rot="10800000" flipH="1" flipV="1">
+            <a:off x="3352799" y="3276600"/>
+            <a:ext cx="223185" cy="296348"/>
+          </a:xfrm>
+          <a:prstGeom prst="bentConnector4">
+            <a:avLst>
+              <a:gd name="adj1" fmla="val -255382"/>
+              <a:gd name="adj2" fmla="val 315242"/>
+            </a:avLst>
+          </a:prstGeom>
+          <a:ln w="19050">
+            <a:tailEnd type="arrow"/>
+          </a:ln>
+        </p:spPr>
+        <p:style>
+          <a:lnRef idx="1">
+            <a:schemeClr val="accent1"/>
+          </a:lnRef>
+          <a:fillRef idx="0">
+            <a:schemeClr val="accent1"/>
+          </a:fillRef>
+          <a:effectRef idx="0">
+            <a:schemeClr val="accent1"/>
+          </a:effectRef>
+          <a:fontRef idx="minor">
+            <a:schemeClr val="tx1"/>
+          </a:fontRef>
+        </p:style>
+      </p:cxnSp>
+      <p:sp>
+        <p:nvSpPr>
+          <p:cNvPr id="16" name="TextBox 15"/>
+          <p:cNvSpPr txBox="1"/>
+          <p:nvPr/>
+        </p:nvSpPr>
+        <p:spPr>
+          <a:xfrm>
+            <a:off x="2362200" y="4240176"/>
+            <a:ext cx="1589794" cy="738664"/>
+          </a:xfrm>
+          <a:prstGeom prst="rect">
+            <a:avLst/>
+          </a:prstGeom>
+          <a:noFill/>
+        </p:spPr>
+        <p:txBody>
+          <a:bodyPr wrap="none" rtlCol="0">
+            <a:spAutoFit/>
+          </a:bodyPr>
+          <a:lstStyle/>
+          <a:p>
+            <a:r>
+              <a:rPr lang="en-GB" sz="1400" dirty="0" err="1" smtClean="0"/>
+              <a:t>osMutexAcquire</a:t>
+            </a:r>
+            <a:r>
+              <a:rPr lang="en-GB" sz="1400" dirty="0" smtClean="0"/>
+              <a:t>() </a:t>
+            </a:r>
+          </a:p>
+          <a:p>
+            <a:r>
+              <a:rPr lang="en-GB" sz="1400" dirty="0" smtClean="0"/>
+              <a:t>[owner == running]</a:t>
+            </a:r>
+          </a:p>
+          <a:p>
+            <a:r>
+              <a:rPr lang="en-GB" sz="1400" dirty="0" smtClean="0"/>
+              <a:t>/ count++</a:t>
+            </a:r>
+            <a:endParaRPr lang="en-GB" sz="1400" dirty="0"/>
+          </a:p>
+        </p:txBody>
+      </p:sp>
+      <p:cxnSp>
+        <p:nvCxnSpPr>
+          <p:cNvPr id="24" name="Elbow Connector 23"/>
+          <p:cNvCxnSpPr>
+            <a:stCxn id="4" idx="6"/>
+            <a:endCxn id="4" idx="5"/>
+          </p:cNvCxnSpPr>
+          <p:nvPr/>
+        </p:nvCxnSpPr>
+        <p:spPr>
+          <a:xfrm flipH="1">
+            <a:off x="4653615" y="3276600"/>
+            <a:ext cx="223185" cy="296348"/>
+          </a:xfrm>
+          <a:prstGeom prst="bentConnector4">
+            <a:avLst>
+              <a:gd name="adj1" fmla="val -260845"/>
+              <a:gd name="adj2" fmla="val 317299"/>
+            </a:avLst>
+          </a:prstGeom>
+          <a:ln w="19050">
+            <a:tailEnd type="arrow"/>
+          </a:ln>
+        </p:spPr>
+        <p:style>
+          <a:lnRef idx="1">
+            <a:schemeClr val="accent1"/>
+          </a:lnRef>
+          <a:fillRef idx="0">
+            <a:schemeClr val="accent1"/>
+          </a:fillRef>
+          <a:effectRef idx="0">
+            <a:schemeClr val="accent1"/>
+          </a:effectRef>
+          <a:fontRef idx="minor">
+            <a:schemeClr val="tx1"/>
+          </a:fontRef>
+        </p:style>
+      </p:cxnSp>
+      <p:sp>
+        <p:nvSpPr>
+          <p:cNvPr id="28" name="TextBox 27"/>
+          <p:cNvSpPr txBox="1"/>
+          <p:nvPr/>
+        </p:nvSpPr>
+        <p:spPr>
+          <a:xfrm>
+            <a:off x="4419600" y="4255552"/>
+            <a:ext cx="2330446" cy="738664"/>
+          </a:xfrm>
+          <a:prstGeom prst="rect">
+            <a:avLst/>
+          </a:prstGeom>
+          <a:noFill/>
+        </p:spPr>
+        <p:txBody>
+          <a:bodyPr wrap="none" rtlCol="0">
+            <a:spAutoFit/>
+          </a:bodyPr>
+          <a:lstStyle/>
+          <a:p>
+            <a:r>
+              <a:rPr lang="en-GB" sz="1400" dirty="0" err="1" smtClean="0"/>
+              <a:t>osMutexRelease</a:t>
+            </a:r>
+            <a:r>
+              <a:rPr lang="en-GB" sz="1400" dirty="0" smtClean="0"/>
+              <a:t>() </a:t>
+            </a:r>
+          </a:p>
+          <a:p>
+            <a:r>
+              <a:rPr lang="en-GB" sz="1400" dirty="0" smtClean="0"/>
+              <a:t>[owner == running &amp;&amp; count]</a:t>
+            </a:r>
+          </a:p>
+          <a:p>
+            <a:r>
+              <a:rPr lang="en-GB" sz="1400" dirty="0" smtClean="0"/>
+              <a:t>/ count--</a:t>
+            </a:r>
+            <a:endParaRPr lang="en-GB" sz="1400" dirty="0"/>
+          </a:p>
+        </p:txBody>
+      </p:sp>
+    </p:spTree>
+    <p:extLst>
+      <p:ext uri="{BB962C8B-B14F-4D97-AF65-F5344CB8AC3E}">
+        <p14:creationId xmlns:p14="http://schemas.microsoft.com/office/powerpoint/2010/main" val="842425735"/>
+      </p:ext>
+    </p:extLst>
+  </p:cSld>
+  <p:clrMapOvr>
+    <a:masterClrMapping/>
+  </p:clrMapOvr>
+</p:sld>
+</file>
+
 <file path=ppt/theme/theme1.xml><?xml version="1.0" encoding="utf-8"?>
 <a:theme xmlns:a="http://schemas.openxmlformats.org/drawingml/2006/main" name="Office Theme">
   <a:themeElements>

</xml_diff>

<commit_message>
Enhanced, fixed and unified CMSIS-RTOS2 Semaphore documentation.
</commit_message>
<xml_diff>
--- a/CMSIS/DoxyGen/src/images/TheoryOfOperation.pptx
+++ b/CMSIS/DoxyGen/src/images/TheoryOfOperation.pptx
@@ -7,6 +7,7 @@
   <p:sldIdLst>
     <p:sldId id="256" r:id="rId2"/>
     <p:sldId id="257" r:id="rId3"/>
+    <p:sldId id="258" r:id="rId4"/>
   </p:sldIdLst>
   <p:sldSz cx="9144000" cy="5715000" type="screen16x10"/>
   <p:notesSz cx="6858000" cy="9144000"/>
@@ -6223,6 +6224,434 @@
     <p:extLst>
       <p:ext uri="{BB962C8B-B14F-4D97-AF65-F5344CB8AC3E}">
         <p14:creationId xmlns:p14="http://schemas.microsoft.com/office/powerpoint/2010/main" val="842425735"/>
+      </p:ext>
+    </p:extLst>
+  </p:cSld>
+  <p:clrMapOvr>
+    <a:masterClrMapping/>
+  </p:clrMapOvr>
+</p:sld>
+</file>
+
+<file path=ppt/slides/slide3.xml><?xml version="1.0" encoding="utf-8"?>
+<p:sld xmlns:a="http://schemas.openxmlformats.org/drawingml/2006/main" xmlns:r="http://schemas.openxmlformats.org/officeDocument/2006/relationships" xmlns:p="http://schemas.openxmlformats.org/presentationml/2006/main">
+  <p:cSld>
+    <p:spTree>
+      <p:nvGrpSpPr>
+        <p:cNvPr id="1" name=""/>
+        <p:cNvGrpSpPr/>
+        <p:nvPr/>
+      </p:nvGrpSpPr>
+      <p:grpSpPr>
+        <a:xfrm>
+          <a:off x="0" y="0"/>
+          <a:ext cx="0" cy="0"/>
+          <a:chOff x="0" y="0"/>
+          <a:chExt cx="0" cy="0"/>
+        </a:xfrm>
+      </p:grpSpPr>
+      <p:sp>
+        <p:nvSpPr>
+          <p:cNvPr id="4" name="Oval 3"/>
+          <p:cNvSpPr/>
+          <p:nvPr/>
+        </p:nvSpPr>
+        <p:spPr>
+          <a:xfrm>
+            <a:off x="3358896" y="1866900"/>
+            <a:ext cx="1524000" cy="838200"/>
+          </a:xfrm>
+          <a:prstGeom prst="ellipse">
+            <a:avLst/>
+          </a:prstGeom>
+          <a:ln w="28575"/>
+        </p:spPr>
+        <p:style>
+          <a:lnRef idx="2">
+            <a:schemeClr val="accent1">
+              <a:shade val="50000"/>
+            </a:schemeClr>
+          </a:lnRef>
+          <a:fillRef idx="1">
+            <a:schemeClr val="accent1"/>
+          </a:fillRef>
+          <a:effectRef idx="0">
+            <a:schemeClr val="accent1"/>
+          </a:effectRef>
+          <a:fontRef idx="minor">
+            <a:schemeClr val="lt1"/>
+          </a:fontRef>
+        </p:style>
+        <p:txBody>
+          <a:bodyPr rtlCol="0" anchor="ctr"/>
+          <a:lstStyle/>
+          <a:p>
+            <a:pPr algn="ctr"/>
+            <a:r>
+              <a:rPr lang="en-GB" dirty="0" smtClean="0"/>
+              <a:t>available</a:t>
+            </a:r>
+            <a:endParaRPr lang="en-GB" dirty="0"/>
+          </a:p>
+        </p:txBody>
+      </p:sp>
+      <p:sp>
+        <p:nvSpPr>
+          <p:cNvPr id="5" name="Oval 4"/>
+          <p:cNvSpPr/>
+          <p:nvPr/>
+        </p:nvSpPr>
+        <p:spPr>
+          <a:xfrm>
+            <a:off x="3358896" y="3695700"/>
+            <a:ext cx="1524000" cy="838200"/>
+          </a:xfrm>
+          <a:prstGeom prst="ellipse">
+            <a:avLst/>
+          </a:prstGeom>
+          <a:ln w="28575"/>
+        </p:spPr>
+        <p:style>
+          <a:lnRef idx="2">
+            <a:schemeClr val="accent1">
+              <a:shade val="50000"/>
+            </a:schemeClr>
+          </a:lnRef>
+          <a:fillRef idx="1">
+            <a:schemeClr val="accent1"/>
+          </a:fillRef>
+          <a:effectRef idx="0">
+            <a:schemeClr val="accent1"/>
+          </a:effectRef>
+          <a:fontRef idx="minor">
+            <a:schemeClr val="lt1"/>
+          </a:fontRef>
+        </p:style>
+        <p:txBody>
+          <a:bodyPr rtlCol="0" anchor="ctr"/>
+          <a:lstStyle/>
+          <a:p>
+            <a:pPr algn="ctr"/>
+            <a:r>
+              <a:rPr lang="en-GB" dirty="0" smtClean="0"/>
+              <a:t>depleted</a:t>
+            </a:r>
+            <a:endParaRPr lang="en-GB" dirty="0"/>
+          </a:p>
+        </p:txBody>
+      </p:sp>
+      <p:cxnSp>
+        <p:nvCxnSpPr>
+          <p:cNvPr id="6" name="Straight Arrow Connector 5"/>
+          <p:cNvCxnSpPr/>
+          <p:nvPr/>
+        </p:nvCxnSpPr>
+        <p:spPr>
+          <a:xfrm>
+            <a:off x="3582081" y="2582348"/>
+            <a:ext cx="0" cy="1236104"/>
+          </a:xfrm>
+          <a:prstGeom prst="straightConnector1">
+            <a:avLst/>
+          </a:prstGeom>
+          <a:ln w="19050">
+            <a:tailEnd type="arrow"/>
+          </a:ln>
+        </p:spPr>
+        <p:style>
+          <a:lnRef idx="1">
+            <a:schemeClr val="accent1"/>
+          </a:lnRef>
+          <a:fillRef idx="0">
+            <a:schemeClr val="accent1"/>
+          </a:fillRef>
+          <a:effectRef idx="0">
+            <a:schemeClr val="accent1"/>
+          </a:effectRef>
+          <a:fontRef idx="minor">
+            <a:schemeClr val="tx1"/>
+          </a:fontRef>
+        </p:style>
+      </p:cxnSp>
+      <p:cxnSp>
+        <p:nvCxnSpPr>
+          <p:cNvPr id="7" name="Straight Arrow Connector 6"/>
+          <p:cNvCxnSpPr/>
+          <p:nvPr/>
+        </p:nvCxnSpPr>
+        <p:spPr>
+          <a:xfrm flipV="1">
+            <a:off x="4659711" y="2582348"/>
+            <a:ext cx="0" cy="1236104"/>
+          </a:xfrm>
+          <a:prstGeom prst="straightConnector1">
+            <a:avLst/>
+          </a:prstGeom>
+          <a:ln w="19050">
+            <a:tailEnd type="arrow"/>
+          </a:ln>
+        </p:spPr>
+        <p:style>
+          <a:lnRef idx="1">
+            <a:schemeClr val="accent1"/>
+          </a:lnRef>
+          <a:fillRef idx="0">
+            <a:schemeClr val="accent1"/>
+          </a:fillRef>
+          <a:effectRef idx="0">
+            <a:schemeClr val="accent1"/>
+          </a:effectRef>
+          <a:fontRef idx="minor">
+            <a:schemeClr val="tx1"/>
+          </a:fontRef>
+        </p:style>
+      </p:cxnSp>
+      <p:sp>
+        <p:nvSpPr>
+          <p:cNvPr id="15" name="TextBox 14"/>
+          <p:cNvSpPr txBox="1"/>
+          <p:nvPr/>
+        </p:nvSpPr>
+        <p:spPr>
+          <a:xfrm>
+            <a:off x="2057400" y="832104"/>
+            <a:ext cx="1893531" cy="523220"/>
+          </a:xfrm>
+          <a:prstGeom prst="rect">
+            <a:avLst/>
+          </a:prstGeom>
+          <a:noFill/>
+        </p:spPr>
+        <p:txBody>
+          <a:bodyPr wrap="none" rtlCol="0">
+            <a:spAutoFit/>
+          </a:bodyPr>
+          <a:lstStyle/>
+          <a:p>
+            <a:pPr algn="ctr"/>
+            <a:r>
+              <a:rPr lang="en-GB" sz="1400" dirty="0" err="1" smtClean="0"/>
+              <a:t>osSemaphoreAcquire</a:t>
+            </a:r>
+            <a:r>
+              <a:rPr lang="en-GB" sz="1400" dirty="0" smtClean="0"/>
+              <a:t>() </a:t>
+            </a:r>
+          </a:p>
+          <a:p>
+            <a:pPr algn="ctr"/>
+            <a:r>
+              <a:rPr lang="en-GB" sz="1400" dirty="0" smtClean="0"/>
+              <a:t>[count &gt; 1] / count--</a:t>
+            </a:r>
+          </a:p>
+        </p:txBody>
+      </p:sp>
+      <p:sp>
+        <p:nvSpPr>
+          <p:cNvPr id="16" name="TextBox 15"/>
+          <p:cNvSpPr txBox="1"/>
+          <p:nvPr/>
+        </p:nvSpPr>
+        <p:spPr>
+          <a:xfrm>
+            <a:off x="1688550" y="2933212"/>
+            <a:ext cx="1893531" cy="523220"/>
+          </a:xfrm>
+          <a:prstGeom prst="rect">
+            <a:avLst/>
+          </a:prstGeom>
+          <a:noFill/>
+        </p:spPr>
+        <p:txBody>
+          <a:bodyPr wrap="none" rtlCol="0">
+            <a:spAutoFit/>
+          </a:bodyPr>
+          <a:lstStyle/>
+          <a:p>
+            <a:pPr algn="ctr"/>
+            <a:r>
+              <a:rPr lang="en-GB" sz="1400" dirty="0" err="1" smtClean="0"/>
+              <a:t>osSemaphoreAcquire</a:t>
+            </a:r>
+            <a:r>
+              <a:rPr lang="en-GB" sz="1400" dirty="0" smtClean="0"/>
+              <a:t>() </a:t>
+            </a:r>
+          </a:p>
+          <a:p>
+            <a:pPr algn="ctr"/>
+            <a:r>
+              <a:rPr lang="en-GB" sz="1400" dirty="0" smtClean="0"/>
+              <a:t>[count==1] / count--</a:t>
+            </a:r>
+          </a:p>
+        </p:txBody>
+      </p:sp>
+      <p:cxnSp>
+        <p:nvCxnSpPr>
+          <p:cNvPr id="18" name="Elbow Connector 17"/>
+          <p:cNvCxnSpPr>
+            <a:stCxn id="4" idx="2"/>
+            <a:endCxn id="4" idx="1"/>
+          </p:cNvCxnSpPr>
+          <p:nvPr/>
+        </p:nvCxnSpPr>
+        <p:spPr>
+          <a:xfrm rot="10800000" flipH="1">
+            <a:off x="3358895" y="1989652"/>
+            <a:ext cx="223185" cy="296348"/>
+          </a:xfrm>
+          <a:prstGeom prst="bentConnector4">
+            <a:avLst>
+              <a:gd name="adj1" fmla="val -181635"/>
+              <a:gd name="adj2" fmla="val 290557"/>
+            </a:avLst>
+          </a:prstGeom>
+          <a:ln w="19050">
+            <a:tailEnd type="arrow"/>
+          </a:ln>
+        </p:spPr>
+        <p:style>
+          <a:lnRef idx="1">
+            <a:schemeClr val="accent1"/>
+          </a:lnRef>
+          <a:fillRef idx="0">
+            <a:schemeClr val="accent1"/>
+          </a:fillRef>
+          <a:effectRef idx="0">
+            <a:schemeClr val="accent1"/>
+          </a:effectRef>
+          <a:fontRef idx="minor">
+            <a:schemeClr val="tx1"/>
+          </a:fontRef>
+        </p:style>
+      </p:cxnSp>
+      <p:cxnSp>
+        <p:nvCxnSpPr>
+          <p:cNvPr id="22" name="Elbow Connector 21"/>
+          <p:cNvCxnSpPr>
+            <a:stCxn id="4" idx="6"/>
+            <a:endCxn id="4" idx="7"/>
+          </p:cNvCxnSpPr>
+          <p:nvPr/>
+        </p:nvCxnSpPr>
+        <p:spPr>
+          <a:xfrm flipH="1" flipV="1">
+            <a:off x="4659711" y="1989652"/>
+            <a:ext cx="223185" cy="296348"/>
+          </a:xfrm>
+          <a:prstGeom prst="bentConnector4">
+            <a:avLst>
+              <a:gd name="adj1" fmla="val -187098"/>
+              <a:gd name="adj2" fmla="val 294671"/>
+            </a:avLst>
+          </a:prstGeom>
+          <a:ln w="19050">
+            <a:tailEnd type="arrow"/>
+          </a:ln>
+        </p:spPr>
+        <p:style>
+          <a:lnRef idx="1">
+            <a:schemeClr val="accent1"/>
+          </a:lnRef>
+          <a:fillRef idx="0">
+            <a:schemeClr val="accent1"/>
+          </a:fillRef>
+          <a:effectRef idx="0">
+            <a:schemeClr val="accent1"/>
+          </a:effectRef>
+          <a:fontRef idx="minor">
+            <a:schemeClr val="tx1"/>
+          </a:fontRef>
+        </p:style>
+      </p:cxnSp>
+      <p:sp>
+        <p:nvSpPr>
+          <p:cNvPr id="25" name="TextBox 24"/>
+          <p:cNvSpPr txBox="1"/>
+          <p:nvPr/>
+        </p:nvSpPr>
+        <p:spPr>
+          <a:xfrm>
+            <a:off x="4682877" y="2943880"/>
+            <a:ext cx="1895968" cy="523220"/>
+          </a:xfrm>
+          <a:prstGeom prst="rect">
+            <a:avLst/>
+          </a:prstGeom>
+          <a:noFill/>
+        </p:spPr>
+        <p:txBody>
+          <a:bodyPr wrap="none" rtlCol="0">
+            <a:spAutoFit/>
+          </a:bodyPr>
+          <a:lstStyle/>
+          <a:p>
+            <a:pPr algn="ctr"/>
+            <a:r>
+              <a:rPr lang="en-GB" sz="1400" dirty="0" err="1" smtClean="0"/>
+              <a:t>osSemaphoreRelease</a:t>
+            </a:r>
+            <a:r>
+              <a:rPr lang="en-GB" sz="1400" dirty="0" smtClean="0"/>
+              <a:t>() </a:t>
+            </a:r>
+          </a:p>
+          <a:p>
+            <a:pPr algn="ctr"/>
+            <a:r>
+              <a:rPr lang="en-GB" sz="1400" dirty="0" smtClean="0"/>
+              <a:t>/ count++</a:t>
+            </a:r>
+          </a:p>
+        </p:txBody>
+      </p:sp>
+      <p:sp>
+        <p:nvSpPr>
+          <p:cNvPr id="26" name="TextBox 25"/>
+          <p:cNvSpPr txBox="1"/>
+          <p:nvPr/>
+        </p:nvSpPr>
+        <p:spPr>
+          <a:xfrm>
+            <a:off x="4641020" y="832104"/>
+            <a:ext cx="1933350" cy="523220"/>
+          </a:xfrm>
+          <a:prstGeom prst="rect">
+            <a:avLst/>
+          </a:prstGeom>
+          <a:noFill/>
+        </p:spPr>
+        <p:txBody>
+          <a:bodyPr wrap="none" rtlCol="0">
+            <a:spAutoFit/>
+          </a:bodyPr>
+          <a:lstStyle/>
+          <a:p>
+            <a:pPr algn="ctr"/>
+            <a:r>
+              <a:rPr lang="en-GB" sz="1400" dirty="0" err="1" smtClean="0"/>
+              <a:t>osSemaphoreRelease</a:t>
+            </a:r>
+            <a:r>
+              <a:rPr lang="en-GB" sz="1400" dirty="0" smtClean="0"/>
+              <a:t>() </a:t>
+            </a:r>
+          </a:p>
+          <a:p>
+            <a:pPr algn="ctr"/>
+            <a:r>
+              <a:rPr lang="en-GB" sz="1400" dirty="0" smtClean="0"/>
+              <a:t>[count &lt; max] / count++</a:t>
+            </a:r>
+          </a:p>
+        </p:txBody>
+      </p:sp>
+    </p:spTree>
+    <p:extLst>
+      <p:ext uri="{BB962C8B-B14F-4D97-AF65-F5344CB8AC3E}">
+        <p14:creationId xmlns:p14="http://schemas.microsoft.com/office/powerpoint/2010/main" val="2574955138"/>
       </p:ext>
     </p:extLst>
   </p:cSld>

</xml_diff>

<commit_message>
Enhanced and unified CMSIS-RTOS2 MemPool documentation.
</commit_message>
<xml_diff>
--- a/CMSIS/DoxyGen/src/images/TheoryOfOperation.pptx
+++ b/CMSIS/DoxyGen/src/images/TheoryOfOperation.pptx
@@ -8,6 +8,7 @@
     <p:sldId id="256" r:id="rId2"/>
     <p:sldId id="257" r:id="rId3"/>
     <p:sldId id="258" r:id="rId4"/>
+    <p:sldId id="259" r:id="rId5"/>
   </p:sldIdLst>
   <p:sldSz cx="9144000" cy="5715000" type="screen16x10"/>
   <p:notesSz cx="6858000" cy="9144000"/>
@@ -6652,6 +6653,629 @@
     <p:extLst>
       <p:ext uri="{BB962C8B-B14F-4D97-AF65-F5344CB8AC3E}">
         <p14:creationId xmlns:p14="http://schemas.microsoft.com/office/powerpoint/2010/main" val="2574955138"/>
+      </p:ext>
+    </p:extLst>
+  </p:cSld>
+  <p:clrMapOvr>
+    <a:masterClrMapping/>
+  </p:clrMapOvr>
+</p:sld>
+</file>
+
+<file path=ppt/slides/slide4.xml><?xml version="1.0" encoding="utf-8"?>
+<p:sld xmlns:a="http://schemas.openxmlformats.org/drawingml/2006/main" xmlns:r="http://schemas.openxmlformats.org/officeDocument/2006/relationships" xmlns:p="http://schemas.openxmlformats.org/presentationml/2006/main">
+  <p:cSld>
+    <p:spTree>
+      <p:nvGrpSpPr>
+        <p:cNvPr id="1" name=""/>
+        <p:cNvGrpSpPr/>
+        <p:nvPr/>
+      </p:nvGrpSpPr>
+      <p:grpSpPr>
+        <a:xfrm>
+          <a:off x="0" y="0"/>
+          <a:ext cx="0" cy="0"/>
+          <a:chOff x="0" y="0"/>
+          <a:chExt cx="0" cy="0"/>
+        </a:xfrm>
+      </p:grpSpPr>
+      <p:sp>
+        <p:nvSpPr>
+          <p:cNvPr id="2" name="Rectangle 1"/>
+          <p:cNvSpPr/>
+          <p:nvPr/>
+        </p:nvSpPr>
+        <p:spPr>
+          <a:xfrm>
+            <a:off x="1325880" y="2857500"/>
+            <a:ext cx="914400" cy="457200"/>
+          </a:xfrm>
+          <a:prstGeom prst="rect">
+            <a:avLst/>
+          </a:prstGeom>
+        </p:spPr>
+        <p:style>
+          <a:lnRef idx="2">
+            <a:schemeClr val="accent1">
+              <a:shade val="50000"/>
+            </a:schemeClr>
+          </a:lnRef>
+          <a:fillRef idx="1">
+            <a:schemeClr val="accent1"/>
+          </a:fillRef>
+          <a:effectRef idx="0">
+            <a:schemeClr val="accent1"/>
+          </a:effectRef>
+          <a:fontRef idx="minor">
+            <a:schemeClr val="lt1"/>
+          </a:fontRef>
+        </p:style>
+        <p:txBody>
+          <a:bodyPr rtlCol="0" anchor="ctr"/>
+          <a:lstStyle/>
+          <a:p>
+            <a:pPr algn="ctr"/>
+            <a:endParaRPr lang="en-GB" dirty="0"/>
+          </a:p>
+        </p:txBody>
+      </p:sp>
+      <p:sp>
+        <p:nvSpPr>
+          <p:cNvPr id="3" name="Rectangle 2"/>
+          <p:cNvSpPr/>
+          <p:nvPr/>
+        </p:nvSpPr>
+        <p:spPr>
+          <a:xfrm>
+            <a:off x="838200" y="2171700"/>
+            <a:ext cx="1828800" cy="457200"/>
+          </a:xfrm>
+          <a:prstGeom prst="rect">
+            <a:avLst/>
+          </a:prstGeom>
+        </p:spPr>
+        <p:style>
+          <a:lnRef idx="2">
+            <a:schemeClr val="accent1">
+              <a:shade val="50000"/>
+            </a:schemeClr>
+          </a:lnRef>
+          <a:fillRef idx="1">
+            <a:schemeClr val="accent1"/>
+          </a:fillRef>
+          <a:effectRef idx="0">
+            <a:schemeClr val="accent1"/>
+          </a:effectRef>
+          <a:fontRef idx="minor">
+            <a:schemeClr val="lt1"/>
+          </a:fontRef>
+        </p:style>
+        <p:txBody>
+          <a:bodyPr rtlCol="0" anchor="ctr"/>
+          <a:lstStyle/>
+          <a:p>
+            <a:r>
+              <a:rPr lang="en-GB" dirty="0" err="1" smtClean="0"/>
+              <a:t>MemPool</a:t>
+            </a:r>
+            <a:endParaRPr lang="en-GB" dirty="0"/>
+          </a:p>
+        </p:txBody>
+      </p:sp>
+      <p:sp>
+        <p:nvSpPr>
+          <p:cNvPr id="4" name="Rectangle 3"/>
+          <p:cNvSpPr/>
+          <p:nvPr/>
+        </p:nvSpPr>
+        <p:spPr>
+          <a:xfrm>
+            <a:off x="2240280" y="2857500"/>
+            <a:ext cx="914400" cy="457200"/>
+          </a:xfrm>
+          <a:prstGeom prst="rect">
+            <a:avLst/>
+          </a:prstGeom>
+        </p:spPr>
+        <p:style>
+          <a:lnRef idx="2">
+            <a:schemeClr val="accent1">
+              <a:shade val="50000"/>
+            </a:schemeClr>
+          </a:lnRef>
+          <a:fillRef idx="1">
+            <a:schemeClr val="accent1"/>
+          </a:fillRef>
+          <a:effectRef idx="0">
+            <a:schemeClr val="accent1"/>
+          </a:effectRef>
+          <a:fontRef idx="minor">
+            <a:schemeClr val="lt1"/>
+          </a:fontRef>
+        </p:style>
+        <p:txBody>
+          <a:bodyPr rtlCol="0" anchor="ctr"/>
+          <a:lstStyle/>
+          <a:p>
+            <a:pPr algn="ctr"/>
+            <a:endParaRPr lang="en-GB"/>
+          </a:p>
+        </p:txBody>
+      </p:sp>
+      <p:sp>
+        <p:nvSpPr>
+          <p:cNvPr id="5" name="Rectangle 4"/>
+          <p:cNvSpPr/>
+          <p:nvPr/>
+        </p:nvSpPr>
+        <p:spPr>
+          <a:xfrm>
+            <a:off x="3160776" y="2545151"/>
+            <a:ext cx="914400" cy="457200"/>
+          </a:xfrm>
+          <a:prstGeom prst="rect">
+            <a:avLst/>
+          </a:prstGeom>
+        </p:spPr>
+        <p:style>
+          <a:lnRef idx="2">
+            <a:schemeClr val="accent6">
+              <a:shade val="50000"/>
+            </a:schemeClr>
+          </a:lnRef>
+          <a:fillRef idx="1">
+            <a:schemeClr val="accent6"/>
+          </a:fillRef>
+          <a:effectRef idx="0">
+            <a:schemeClr val="accent6"/>
+          </a:effectRef>
+          <a:fontRef idx="minor">
+            <a:schemeClr val="lt1"/>
+          </a:fontRef>
+        </p:style>
+        <p:txBody>
+          <a:bodyPr rtlCol="0" anchor="ctr"/>
+          <a:lstStyle/>
+          <a:p>
+            <a:pPr algn="ctr"/>
+            <a:r>
+              <a:rPr lang="en-GB" sz="1400" dirty="0" smtClean="0"/>
+              <a:t>used</a:t>
+            </a:r>
+            <a:endParaRPr lang="en-GB" dirty="0"/>
+          </a:p>
+        </p:txBody>
+      </p:sp>
+      <p:sp>
+        <p:nvSpPr>
+          <p:cNvPr id="6" name="Rectangle 5"/>
+          <p:cNvSpPr/>
+          <p:nvPr/>
+        </p:nvSpPr>
+        <p:spPr>
+          <a:xfrm>
+            <a:off x="4075176" y="2545151"/>
+            <a:ext cx="914400" cy="457200"/>
+          </a:xfrm>
+          <a:prstGeom prst="rect">
+            <a:avLst/>
+          </a:prstGeom>
+        </p:spPr>
+        <p:style>
+          <a:lnRef idx="2">
+            <a:schemeClr val="accent6">
+              <a:shade val="50000"/>
+            </a:schemeClr>
+          </a:lnRef>
+          <a:fillRef idx="1">
+            <a:schemeClr val="accent6"/>
+          </a:fillRef>
+          <a:effectRef idx="0">
+            <a:schemeClr val="accent6"/>
+          </a:effectRef>
+          <a:fontRef idx="minor">
+            <a:schemeClr val="lt1"/>
+          </a:fontRef>
+        </p:style>
+        <p:txBody>
+          <a:bodyPr rtlCol="0" anchor="ctr"/>
+          <a:lstStyle/>
+          <a:p>
+            <a:pPr algn="ctr"/>
+            <a:r>
+              <a:rPr lang="en-GB" sz="1400" dirty="0" smtClean="0"/>
+              <a:t>used</a:t>
+            </a:r>
+            <a:endParaRPr lang="en-GB" sz="1400" dirty="0"/>
+          </a:p>
+        </p:txBody>
+      </p:sp>
+      <p:sp>
+        <p:nvSpPr>
+          <p:cNvPr id="7" name="Rectangle 6"/>
+          <p:cNvSpPr/>
+          <p:nvPr/>
+        </p:nvSpPr>
+        <p:spPr>
+          <a:xfrm>
+            <a:off x="4983480" y="2857500"/>
+            <a:ext cx="914400" cy="457200"/>
+          </a:xfrm>
+          <a:prstGeom prst="rect">
+            <a:avLst/>
+          </a:prstGeom>
+        </p:spPr>
+        <p:style>
+          <a:lnRef idx="2">
+            <a:schemeClr val="accent1">
+              <a:shade val="50000"/>
+            </a:schemeClr>
+          </a:lnRef>
+          <a:fillRef idx="1">
+            <a:schemeClr val="accent1"/>
+          </a:fillRef>
+          <a:effectRef idx="0">
+            <a:schemeClr val="accent1"/>
+          </a:effectRef>
+          <a:fontRef idx="minor">
+            <a:schemeClr val="lt1"/>
+          </a:fontRef>
+        </p:style>
+        <p:txBody>
+          <a:bodyPr rtlCol="0" anchor="ctr"/>
+          <a:lstStyle/>
+          <a:p>
+            <a:pPr algn="ctr"/>
+            <a:endParaRPr lang="en-GB"/>
+          </a:p>
+        </p:txBody>
+      </p:sp>
+      <p:sp>
+        <p:nvSpPr>
+          <p:cNvPr id="8" name="Rectangle 7"/>
+          <p:cNvSpPr/>
+          <p:nvPr/>
+        </p:nvSpPr>
+        <p:spPr>
+          <a:xfrm>
+            <a:off x="5893308" y="2545151"/>
+            <a:ext cx="914400" cy="457200"/>
+          </a:xfrm>
+          <a:prstGeom prst="rect">
+            <a:avLst/>
+          </a:prstGeom>
+        </p:spPr>
+        <p:style>
+          <a:lnRef idx="2">
+            <a:schemeClr val="accent6">
+              <a:shade val="50000"/>
+            </a:schemeClr>
+          </a:lnRef>
+          <a:fillRef idx="1">
+            <a:schemeClr val="accent6"/>
+          </a:fillRef>
+          <a:effectRef idx="0">
+            <a:schemeClr val="accent6"/>
+          </a:effectRef>
+          <a:fontRef idx="minor">
+            <a:schemeClr val="lt1"/>
+          </a:fontRef>
+        </p:style>
+        <p:txBody>
+          <a:bodyPr rtlCol="0" anchor="ctr"/>
+          <a:lstStyle/>
+          <a:p>
+            <a:pPr algn="ctr"/>
+            <a:r>
+              <a:rPr lang="en-GB" sz="1400" dirty="0" smtClean="0"/>
+              <a:t>used</a:t>
+            </a:r>
+            <a:endParaRPr lang="en-GB" sz="1400" dirty="0"/>
+          </a:p>
+        </p:txBody>
+      </p:sp>
+      <p:sp>
+        <p:nvSpPr>
+          <p:cNvPr id="9" name="Rectangle 8"/>
+          <p:cNvSpPr/>
+          <p:nvPr/>
+        </p:nvSpPr>
+        <p:spPr>
+          <a:xfrm>
+            <a:off x="6812280" y="2857500"/>
+            <a:ext cx="914400" cy="457200"/>
+          </a:xfrm>
+          <a:prstGeom prst="rect">
+            <a:avLst/>
+          </a:prstGeom>
+        </p:spPr>
+        <p:style>
+          <a:lnRef idx="2">
+            <a:schemeClr val="accent1">
+              <a:shade val="50000"/>
+            </a:schemeClr>
+          </a:lnRef>
+          <a:fillRef idx="1">
+            <a:schemeClr val="accent1"/>
+          </a:fillRef>
+          <a:effectRef idx="0">
+            <a:schemeClr val="accent1"/>
+          </a:effectRef>
+          <a:fontRef idx="minor">
+            <a:schemeClr val="lt1"/>
+          </a:fontRef>
+        </p:style>
+        <p:txBody>
+          <a:bodyPr rtlCol="0" anchor="ctr"/>
+          <a:lstStyle/>
+          <a:p>
+            <a:pPr algn="ctr"/>
+            <a:endParaRPr lang="en-GB"/>
+          </a:p>
+        </p:txBody>
+      </p:sp>
+      <p:cxnSp>
+        <p:nvCxnSpPr>
+          <p:cNvPr id="11" name="Straight Arrow Connector 10"/>
+          <p:cNvCxnSpPr/>
+          <p:nvPr/>
+        </p:nvCxnSpPr>
+        <p:spPr>
+          <a:xfrm flipH="1">
+            <a:off x="1447800" y="2400300"/>
+            <a:ext cx="762000" cy="457200"/>
+          </a:xfrm>
+          <a:prstGeom prst="straightConnector1">
+            <a:avLst/>
+          </a:prstGeom>
+          <a:ln w="19050">
+            <a:headEnd type="oval" w="med" len="med"/>
+            <a:tailEnd type="arrow"/>
+          </a:ln>
+        </p:spPr>
+        <p:style>
+          <a:lnRef idx="1">
+            <a:schemeClr val="dk1"/>
+          </a:lnRef>
+          <a:fillRef idx="0">
+            <a:schemeClr val="dk1"/>
+          </a:fillRef>
+          <a:effectRef idx="0">
+            <a:schemeClr val="dk1"/>
+          </a:effectRef>
+          <a:fontRef idx="minor">
+            <a:schemeClr val="tx1"/>
+          </a:fontRef>
+        </p:style>
+      </p:cxnSp>
+      <p:cxnSp>
+        <p:nvCxnSpPr>
+          <p:cNvPr id="33" name="Straight Arrow Connector 32"/>
+          <p:cNvCxnSpPr>
+            <a:endCxn id="4" idx="1"/>
+          </p:cNvCxnSpPr>
+          <p:nvPr/>
+        </p:nvCxnSpPr>
+        <p:spPr>
+          <a:xfrm>
+            <a:off x="1524000" y="3086100"/>
+            <a:ext cx="716280" cy="0"/>
+          </a:xfrm>
+          <a:prstGeom prst="straightConnector1">
+            <a:avLst/>
+          </a:prstGeom>
+          <a:ln w="19050">
+            <a:headEnd type="oval" w="med" len="med"/>
+            <a:tailEnd type="arrow"/>
+          </a:ln>
+        </p:spPr>
+        <p:style>
+          <a:lnRef idx="1">
+            <a:schemeClr val="dk1"/>
+          </a:lnRef>
+          <a:fillRef idx="0">
+            <a:schemeClr val="dk1"/>
+          </a:fillRef>
+          <a:effectRef idx="0">
+            <a:schemeClr val="dk1"/>
+          </a:effectRef>
+          <a:fontRef idx="minor">
+            <a:schemeClr val="tx1"/>
+          </a:fontRef>
+        </p:style>
+      </p:cxnSp>
+      <p:cxnSp>
+        <p:nvCxnSpPr>
+          <p:cNvPr id="37" name="Straight Arrow Connector 36"/>
+          <p:cNvCxnSpPr/>
+          <p:nvPr/>
+        </p:nvCxnSpPr>
+        <p:spPr>
+          <a:xfrm>
+            <a:off x="2438400" y="3086100"/>
+            <a:ext cx="2545080" cy="0"/>
+          </a:xfrm>
+          <a:prstGeom prst="straightConnector1">
+            <a:avLst/>
+          </a:prstGeom>
+          <a:ln w="19050">
+            <a:headEnd type="oval" w="med" len="med"/>
+            <a:tailEnd type="arrow"/>
+          </a:ln>
+        </p:spPr>
+        <p:style>
+          <a:lnRef idx="1">
+            <a:schemeClr val="dk1"/>
+          </a:lnRef>
+          <a:fillRef idx="0">
+            <a:schemeClr val="dk1"/>
+          </a:fillRef>
+          <a:effectRef idx="0">
+            <a:schemeClr val="dk1"/>
+          </a:effectRef>
+          <a:fontRef idx="minor">
+            <a:schemeClr val="tx1"/>
+          </a:fontRef>
+        </p:style>
+      </p:cxnSp>
+      <p:cxnSp>
+        <p:nvCxnSpPr>
+          <p:cNvPr id="41" name="Straight Arrow Connector 40"/>
+          <p:cNvCxnSpPr/>
+          <p:nvPr/>
+        </p:nvCxnSpPr>
+        <p:spPr>
+          <a:xfrm>
+            <a:off x="5181600" y="3084576"/>
+            <a:ext cx="1630680" cy="0"/>
+          </a:xfrm>
+          <a:prstGeom prst="straightConnector1">
+            <a:avLst/>
+          </a:prstGeom>
+          <a:ln w="19050">
+            <a:headEnd type="oval" w="med" len="med"/>
+            <a:tailEnd type="arrow"/>
+          </a:ln>
+        </p:spPr>
+        <p:style>
+          <a:lnRef idx="1">
+            <a:schemeClr val="dk1"/>
+          </a:lnRef>
+          <a:fillRef idx="0">
+            <a:schemeClr val="dk1"/>
+          </a:fillRef>
+          <a:effectRef idx="0">
+            <a:schemeClr val="dk1"/>
+          </a:effectRef>
+          <a:fontRef idx="minor">
+            <a:schemeClr val="tx1"/>
+          </a:fontRef>
+        </p:style>
+      </p:cxnSp>
+      <p:sp>
+        <p:nvSpPr>
+          <p:cNvPr id="43" name="TextBox 42"/>
+          <p:cNvSpPr txBox="1"/>
+          <p:nvPr/>
+        </p:nvSpPr>
+        <p:spPr>
+          <a:xfrm>
+            <a:off x="1295400" y="3006923"/>
+            <a:ext cx="506292" cy="307777"/>
+          </a:xfrm>
+          <a:prstGeom prst="rect">
+            <a:avLst/>
+          </a:prstGeom>
+          <a:noFill/>
+        </p:spPr>
+        <p:txBody>
+          <a:bodyPr wrap="none" rtlCol="0">
+            <a:spAutoFit/>
+          </a:bodyPr>
+          <a:lstStyle/>
+          <a:p>
+            <a:r>
+              <a:rPr lang="en-GB" sz="1400" dirty="0" smtClean="0"/>
+              <a:t>next</a:t>
+            </a:r>
+            <a:endParaRPr lang="en-GB" sz="1400" dirty="0"/>
+          </a:p>
+        </p:txBody>
+      </p:sp>
+      <p:sp>
+        <p:nvSpPr>
+          <p:cNvPr id="44" name="TextBox 43"/>
+          <p:cNvSpPr txBox="1"/>
+          <p:nvPr/>
+        </p:nvSpPr>
+        <p:spPr>
+          <a:xfrm>
+            <a:off x="2209800" y="2246411"/>
+            <a:ext cx="478849" cy="307777"/>
+          </a:xfrm>
+          <a:prstGeom prst="rect">
+            <a:avLst/>
+          </a:prstGeom>
+          <a:noFill/>
+        </p:spPr>
+        <p:txBody>
+          <a:bodyPr wrap="none" rtlCol="0">
+            <a:spAutoFit/>
+          </a:bodyPr>
+          <a:lstStyle/>
+          <a:p>
+            <a:r>
+              <a:rPr lang="en-GB" sz="1400" dirty="0" smtClean="0"/>
+              <a:t>free</a:t>
+            </a:r>
+            <a:endParaRPr lang="en-GB" sz="1400" dirty="0"/>
+          </a:p>
+        </p:txBody>
+      </p:sp>
+      <p:sp>
+        <p:nvSpPr>
+          <p:cNvPr id="45" name="TextBox 44"/>
+          <p:cNvSpPr txBox="1"/>
+          <p:nvPr/>
+        </p:nvSpPr>
+        <p:spPr>
+          <a:xfrm>
+            <a:off x="2246376" y="3008411"/>
+            <a:ext cx="506292" cy="307777"/>
+          </a:xfrm>
+          <a:prstGeom prst="rect">
+            <a:avLst/>
+          </a:prstGeom>
+          <a:noFill/>
+        </p:spPr>
+        <p:txBody>
+          <a:bodyPr wrap="none" rtlCol="0">
+            <a:spAutoFit/>
+          </a:bodyPr>
+          <a:lstStyle/>
+          <a:p>
+            <a:r>
+              <a:rPr lang="en-GB" sz="1400" dirty="0" smtClean="0"/>
+              <a:t>next</a:t>
+            </a:r>
+            <a:endParaRPr lang="en-GB" sz="1400" dirty="0"/>
+          </a:p>
+        </p:txBody>
+      </p:sp>
+      <p:sp>
+        <p:nvSpPr>
+          <p:cNvPr id="46" name="TextBox 45"/>
+          <p:cNvSpPr txBox="1"/>
+          <p:nvPr/>
+        </p:nvSpPr>
+        <p:spPr>
+          <a:xfrm>
+            <a:off x="4983480" y="3009827"/>
+            <a:ext cx="506292" cy="307777"/>
+          </a:xfrm>
+          <a:prstGeom prst="rect">
+            <a:avLst/>
+          </a:prstGeom>
+          <a:noFill/>
+        </p:spPr>
+        <p:txBody>
+          <a:bodyPr wrap="none" rtlCol="0">
+            <a:spAutoFit/>
+          </a:bodyPr>
+          <a:lstStyle/>
+          <a:p>
+            <a:r>
+              <a:rPr lang="en-GB" sz="1400" dirty="0" smtClean="0"/>
+              <a:t>next</a:t>
+            </a:r>
+            <a:endParaRPr lang="en-GB" sz="1400" dirty="0"/>
+          </a:p>
+        </p:txBody>
+      </p:sp>
+    </p:spTree>
+    <p:extLst>
+      <p:ext uri="{BB962C8B-B14F-4D97-AF65-F5344CB8AC3E}">
+        <p14:creationId xmlns:p14="http://schemas.microsoft.com/office/powerpoint/2010/main" val="627865513"/>
       </p:ext>
     </p:extLst>
   </p:cSld>

</xml_diff>